<commit_message>
Add github ref to slides
</commit_message>
<xml_diff>
--- a/docs/Data606_TeamH_Butler_Patel_ClimatePolicyEffects_Intro.pptx
+++ b/docs/Data606_TeamH_Butler_Patel_ClimatePolicyEffects_Intro.pptx
@@ -33,6 +33,7 @@
     <p:sldId id="278" r:id="rId27"/>
     <p:sldId id="279" r:id="rId28"/>
     <p:sldId id="280" r:id="rId29"/>
+    <p:sldId id="281" r:id="rId30"/>
   </p:sldIdLst>
   <p:sldSz cy="5143500" cx="9144000"/>
   <p:notesSz cx="7772400" cy="10058400"/>
@@ -798,7 +799,7 @@
   <p:cSld>
     <p:spTree>
       <p:nvGrpSpPr>
-        <p:cNvPr id="121" name="Shape 121"/>
+        <p:cNvPr id="120" name="Shape 120"/>
         <p:cNvGrpSpPr/>
         <p:nvPr/>
       </p:nvGrpSpPr>
@@ -812,7 +813,7 @@
       </p:grpSpPr>
       <p:sp>
         <p:nvSpPr>
-          <p:cNvPr id="122" name="Google Shape;122;g2846881785c_0_7:notes"/>
+          <p:cNvPr id="121" name="Google Shape;121;g2846881785c_0_7:notes"/>
           <p:cNvSpPr txBox="1"/>
           <p:nvPr>
             <p:ph idx="1" type="body"/>
@@ -851,7 +852,7 @@
       </p:sp>
       <p:sp>
         <p:nvSpPr>
-          <p:cNvPr id="123" name="Google Shape;123;g2846881785c_0_7:notes"/>
+          <p:cNvPr id="122" name="Google Shape;122;g2846881785c_0_7:notes"/>
           <p:cNvSpPr/>
           <p:nvPr>
             <p:ph idx="2" type="sldImg"/>
@@ -897,7 +898,7 @@
   <p:cSld>
     <p:spTree>
       <p:nvGrpSpPr>
-        <p:cNvPr id="128" name="Shape 128"/>
+        <p:cNvPr id="127" name="Shape 127"/>
         <p:cNvGrpSpPr/>
         <p:nvPr/>
       </p:nvGrpSpPr>
@@ -911,7 +912,7 @@
       </p:grpSpPr>
       <p:sp>
         <p:nvSpPr>
-          <p:cNvPr id="129" name="Google Shape;129;g282cffbbf5b_0_6:notes"/>
+          <p:cNvPr id="128" name="Google Shape;128;g282cffbbf5b_0_6:notes"/>
           <p:cNvSpPr txBox="1"/>
           <p:nvPr>
             <p:ph idx="1" type="body"/>
@@ -950,7 +951,7 @@
       </p:sp>
       <p:sp>
         <p:nvSpPr>
-          <p:cNvPr id="130" name="Google Shape;130;g282cffbbf5b_0_6:notes"/>
+          <p:cNvPr id="129" name="Google Shape;129;g282cffbbf5b_0_6:notes"/>
           <p:cNvSpPr/>
           <p:nvPr>
             <p:ph idx="2" type="sldImg"/>
@@ -996,7 +997,7 @@
   <p:cSld>
     <p:spTree>
       <p:nvGrpSpPr>
-        <p:cNvPr id="135" name="Shape 135"/>
+        <p:cNvPr id="134" name="Shape 134"/>
         <p:cNvGrpSpPr/>
         <p:nvPr/>
       </p:nvGrpSpPr>
@@ -1010,7 +1011,7 @@
       </p:grpSpPr>
       <p:sp>
         <p:nvSpPr>
-          <p:cNvPr id="136" name="Google Shape;136;g2846881785c_0_0:notes"/>
+          <p:cNvPr id="135" name="Google Shape;135;g2846881785c_0_0:notes"/>
           <p:cNvSpPr txBox="1"/>
           <p:nvPr>
             <p:ph idx="1" type="body"/>
@@ -1049,7 +1050,7 @@
       </p:sp>
       <p:sp>
         <p:nvSpPr>
-          <p:cNvPr id="137" name="Google Shape;137;g2846881785c_0_0:notes"/>
+          <p:cNvPr id="136" name="Google Shape;136;g2846881785c_0_0:notes"/>
           <p:cNvSpPr/>
           <p:nvPr>
             <p:ph idx="2" type="sldImg"/>
@@ -1095,7 +1096,7 @@
   <p:cSld>
     <p:spTree>
       <p:nvGrpSpPr>
-        <p:cNvPr id="142" name="Shape 142"/>
+        <p:cNvPr id="141" name="Shape 141"/>
         <p:cNvGrpSpPr/>
         <p:nvPr/>
       </p:nvGrpSpPr>
@@ -1109,7 +1110,7 @@
       </p:grpSpPr>
       <p:sp>
         <p:nvSpPr>
-          <p:cNvPr id="143" name="Google Shape;143;p8:notes"/>
+          <p:cNvPr id="142" name="Google Shape;142;p8:notes"/>
           <p:cNvSpPr txBox="1"/>
           <p:nvPr>
             <p:ph idx="1" type="body"/>
@@ -1148,7 +1149,7 @@
       </p:sp>
       <p:sp>
         <p:nvSpPr>
-          <p:cNvPr id="144" name="Google Shape;144;p8:notes"/>
+          <p:cNvPr id="143" name="Google Shape;143;p8:notes"/>
           <p:cNvSpPr/>
           <p:nvPr>
             <p:ph idx="2" type="sldImg"/>
@@ -1194,7 +1195,7 @@
   <p:cSld>
     <p:spTree>
       <p:nvGrpSpPr>
-        <p:cNvPr id="149" name="Shape 149"/>
+        <p:cNvPr id="148" name="Shape 148"/>
         <p:cNvGrpSpPr/>
         <p:nvPr/>
       </p:nvGrpSpPr>
@@ -1208,7 +1209,7 @@
       </p:grpSpPr>
       <p:sp>
         <p:nvSpPr>
-          <p:cNvPr id="150" name="Google Shape;150;g2847bb41301_0_31:notes"/>
+          <p:cNvPr id="149" name="Google Shape;149;g2847bb41301_0_31:notes"/>
           <p:cNvSpPr txBox="1"/>
           <p:nvPr>
             <p:ph idx="1" type="body"/>
@@ -1247,7 +1248,7 @@
       </p:sp>
       <p:sp>
         <p:nvSpPr>
-          <p:cNvPr id="151" name="Google Shape;151;g2847bb41301_0_31:notes"/>
+          <p:cNvPr id="150" name="Google Shape;150;g2847bb41301_0_31:notes"/>
           <p:cNvSpPr/>
           <p:nvPr>
             <p:ph idx="2" type="sldImg"/>
@@ -1293,7 +1294,7 @@
   <p:cSld>
     <p:spTree>
       <p:nvGrpSpPr>
-        <p:cNvPr id="156" name="Shape 156"/>
+        <p:cNvPr id="155" name="Shape 155"/>
         <p:cNvGrpSpPr/>
         <p:nvPr/>
       </p:nvGrpSpPr>
@@ -1307,7 +1308,7 @@
       </p:grpSpPr>
       <p:sp>
         <p:nvSpPr>
-          <p:cNvPr id="157" name="Google Shape;157;p7:notes"/>
+          <p:cNvPr id="156" name="Google Shape;156;p7:notes"/>
           <p:cNvSpPr txBox="1"/>
           <p:nvPr>
             <p:ph idx="1" type="body"/>
@@ -1346,7 +1347,7 @@
       </p:sp>
       <p:sp>
         <p:nvSpPr>
-          <p:cNvPr id="158" name="Google Shape;158;p7:notes"/>
+          <p:cNvPr id="157" name="Google Shape;157;p7:notes"/>
           <p:cNvSpPr/>
           <p:nvPr>
             <p:ph idx="2" type="sldImg"/>
@@ -1392,7 +1393,7 @@
   <p:cSld>
     <p:spTree>
       <p:nvGrpSpPr>
-        <p:cNvPr id="163" name="Shape 163"/>
+        <p:cNvPr id="162" name="Shape 162"/>
         <p:cNvGrpSpPr/>
         <p:nvPr/>
       </p:nvGrpSpPr>
@@ -1406,7 +1407,7 @@
       </p:grpSpPr>
       <p:sp>
         <p:nvSpPr>
-          <p:cNvPr id="164" name="Google Shape;164;g2847bb41301_0_24:notes"/>
+          <p:cNvPr id="163" name="Google Shape;163;g2847bb41301_0_24:notes"/>
           <p:cNvSpPr txBox="1"/>
           <p:nvPr>
             <p:ph idx="1" type="body"/>
@@ -1445,7 +1446,7 @@
       </p:sp>
       <p:sp>
         <p:nvSpPr>
-          <p:cNvPr id="165" name="Google Shape;165;g2847bb41301_0_24:notes"/>
+          <p:cNvPr id="164" name="Google Shape;164;g2847bb41301_0_24:notes"/>
           <p:cNvSpPr/>
           <p:nvPr>
             <p:ph idx="2" type="sldImg"/>
@@ -1491,7 +1492,7 @@
   <p:cSld>
     <p:spTree>
       <p:nvGrpSpPr>
-        <p:cNvPr id="170" name="Shape 170"/>
+        <p:cNvPr id="169" name="Shape 169"/>
         <p:cNvGrpSpPr/>
         <p:nvPr/>
       </p:nvGrpSpPr>
@@ -1505,7 +1506,7 @@
       </p:grpSpPr>
       <p:sp>
         <p:nvSpPr>
-          <p:cNvPr id="171" name="Google Shape;171;g282788f438d_1_6:notes"/>
+          <p:cNvPr id="170" name="Google Shape;170;g282788f438d_1_6:notes"/>
           <p:cNvSpPr txBox="1"/>
           <p:nvPr>
             <p:ph idx="1" type="body"/>
@@ -1544,7 +1545,7 @@
       </p:sp>
       <p:sp>
         <p:nvSpPr>
-          <p:cNvPr id="172" name="Google Shape;172;g282788f438d_1_6:notes"/>
+          <p:cNvPr id="171" name="Google Shape;171;g282788f438d_1_6:notes"/>
           <p:cNvSpPr/>
           <p:nvPr>
             <p:ph idx="2" type="sldImg"/>
@@ -1590,7 +1591,7 @@
   <p:cSld>
     <p:spTree>
       <p:nvGrpSpPr>
-        <p:cNvPr id="177" name="Shape 177"/>
+        <p:cNvPr id="176" name="Shape 176"/>
         <p:cNvGrpSpPr/>
         <p:nvPr/>
       </p:nvGrpSpPr>
@@ -1604,7 +1605,7 @@
       </p:grpSpPr>
       <p:sp>
         <p:nvSpPr>
-          <p:cNvPr id="178" name="Google Shape;178;g2847bb41301_0_17:notes"/>
+          <p:cNvPr id="177" name="Google Shape;177;g2847bb41301_0_17:notes"/>
           <p:cNvSpPr txBox="1"/>
           <p:nvPr>
             <p:ph idx="1" type="body"/>
@@ -1643,7 +1644,7 @@
       </p:sp>
       <p:sp>
         <p:nvSpPr>
-          <p:cNvPr id="179" name="Google Shape;179;g2847bb41301_0_17:notes"/>
+          <p:cNvPr id="178" name="Google Shape;178;g2847bb41301_0_17:notes"/>
           <p:cNvSpPr/>
           <p:nvPr>
             <p:ph idx="2" type="sldImg"/>
@@ -1689,7 +1690,7 @@
   <p:cSld>
     <p:spTree>
       <p:nvGrpSpPr>
-        <p:cNvPr id="184" name="Shape 184"/>
+        <p:cNvPr id="183" name="Shape 183"/>
         <p:cNvGrpSpPr/>
         <p:nvPr/>
       </p:nvGrpSpPr>
@@ -1703,7 +1704,7 @@
       </p:grpSpPr>
       <p:sp>
         <p:nvSpPr>
-          <p:cNvPr id="185" name="Google Shape;185;g282788f438d_1_12:notes"/>
+          <p:cNvPr id="184" name="Google Shape;184;g282788f438d_1_12:notes"/>
           <p:cNvSpPr txBox="1"/>
           <p:nvPr>
             <p:ph idx="1" type="body"/>
@@ -1742,7 +1743,7 @@
       </p:sp>
       <p:sp>
         <p:nvSpPr>
-          <p:cNvPr id="186" name="Google Shape;186;g282788f438d_1_12:notes"/>
+          <p:cNvPr id="185" name="Google Shape;185;g282788f438d_1_12:notes"/>
           <p:cNvSpPr/>
           <p:nvPr>
             <p:ph idx="2" type="sldImg"/>
@@ -1788,7 +1789,7 @@
   <p:cSld>
     <p:spTree>
       <p:nvGrpSpPr>
-        <p:cNvPr id="65" name="Shape 65"/>
+        <p:cNvPr id="64" name="Shape 64"/>
         <p:cNvGrpSpPr/>
         <p:nvPr/>
       </p:nvGrpSpPr>
@@ -1802,7 +1803,7 @@
       </p:grpSpPr>
       <p:sp>
         <p:nvSpPr>
-          <p:cNvPr id="66" name="Google Shape;66;p2:notes"/>
+          <p:cNvPr id="65" name="Google Shape;65;p2:notes"/>
           <p:cNvSpPr txBox="1"/>
           <p:nvPr>
             <p:ph idx="1" type="body"/>
@@ -1841,7 +1842,7 @@
       </p:sp>
       <p:sp>
         <p:nvSpPr>
-          <p:cNvPr id="67" name="Google Shape;67;p2:notes"/>
+          <p:cNvPr id="66" name="Google Shape;66;p2:notes"/>
           <p:cNvSpPr/>
           <p:nvPr>
             <p:ph idx="2" type="sldImg"/>
@@ -1887,7 +1888,7 @@
   <p:cSld>
     <p:spTree>
       <p:nvGrpSpPr>
-        <p:cNvPr id="191" name="Shape 191"/>
+        <p:cNvPr id="190" name="Shape 190"/>
         <p:cNvGrpSpPr/>
         <p:nvPr/>
       </p:nvGrpSpPr>
@@ -1901,7 +1902,7 @@
       </p:grpSpPr>
       <p:sp>
         <p:nvSpPr>
-          <p:cNvPr id="192" name="Google Shape;192;g2847bb41301_0_3:notes"/>
+          <p:cNvPr id="191" name="Google Shape;191;g2847bb41301_0_3:notes"/>
           <p:cNvSpPr txBox="1"/>
           <p:nvPr>
             <p:ph idx="1" type="body"/>
@@ -1940,7 +1941,7 @@
       </p:sp>
       <p:sp>
         <p:nvSpPr>
-          <p:cNvPr id="193" name="Google Shape;193;g2847bb41301_0_3:notes"/>
+          <p:cNvPr id="192" name="Google Shape;192;g2847bb41301_0_3:notes"/>
           <p:cNvSpPr/>
           <p:nvPr>
             <p:ph idx="2" type="sldImg"/>
@@ -1986,7 +1987,7 @@
   <p:cSld>
     <p:spTree>
       <p:nvGrpSpPr>
-        <p:cNvPr id="198" name="Shape 198"/>
+        <p:cNvPr id="197" name="Shape 197"/>
         <p:cNvGrpSpPr/>
         <p:nvPr/>
       </p:nvGrpSpPr>
@@ -2000,7 +2001,7 @@
       </p:grpSpPr>
       <p:sp>
         <p:nvSpPr>
-          <p:cNvPr id="199" name="Google Shape;199;g282788f438d_1_0:notes"/>
+          <p:cNvPr id="198" name="Google Shape;198;g282788f438d_1_0:notes"/>
           <p:cNvSpPr txBox="1"/>
           <p:nvPr>
             <p:ph idx="1" type="body"/>
@@ -2039,7 +2040,7 @@
       </p:sp>
       <p:sp>
         <p:nvSpPr>
-          <p:cNvPr id="200" name="Google Shape;200;g282788f438d_1_0:notes"/>
+          <p:cNvPr id="199" name="Google Shape;199;g282788f438d_1_0:notes"/>
           <p:cNvSpPr/>
           <p:nvPr>
             <p:ph idx="2" type="sldImg"/>
@@ -2085,7 +2086,7 @@
   <p:cSld>
     <p:spTree>
       <p:nvGrpSpPr>
-        <p:cNvPr id="205" name="Shape 205"/>
+        <p:cNvPr id="204" name="Shape 204"/>
         <p:cNvGrpSpPr/>
         <p:nvPr/>
       </p:nvGrpSpPr>
@@ -2099,7 +2100,7 @@
       </p:grpSpPr>
       <p:sp>
         <p:nvSpPr>
-          <p:cNvPr id="206" name="Google Shape;206;g2847bb41301_0_10:notes"/>
+          <p:cNvPr id="205" name="Google Shape;205;g2847bb41301_0_10:notes"/>
           <p:cNvSpPr txBox="1"/>
           <p:nvPr>
             <p:ph idx="1" type="body"/>
@@ -2138,7 +2139,7 @@
       </p:sp>
       <p:sp>
         <p:nvSpPr>
-          <p:cNvPr id="207" name="Google Shape;207;g2847bb41301_0_10:notes"/>
+          <p:cNvPr id="206" name="Google Shape;206;g2847bb41301_0_10:notes"/>
           <p:cNvSpPr/>
           <p:nvPr>
             <p:ph idx="2" type="sldImg"/>
@@ -2184,7 +2185,7 @@
   <p:cSld>
     <p:spTree>
       <p:nvGrpSpPr>
-        <p:cNvPr id="212" name="Shape 212"/>
+        <p:cNvPr id="211" name="Shape 211"/>
         <p:cNvGrpSpPr/>
         <p:nvPr/>
       </p:nvGrpSpPr>
@@ -2198,7 +2199,7 @@
       </p:grpSpPr>
       <p:sp>
         <p:nvSpPr>
-          <p:cNvPr id="213" name="Google Shape;213;g2847bb41301_0_38:notes"/>
+          <p:cNvPr id="212" name="Google Shape;212;g2847bb41301_0_38:notes"/>
           <p:cNvSpPr txBox="1"/>
           <p:nvPr>
             <p:ph idx="1" type="body"/>
@@ -2237,7 +2238,7 @@
       </p:sp>
       <p:sp>
         <p:nvSpPr>
-          <p:cNvPr id="214" name="Google Shape;214;g2847bb41301_0_38:notes"/>
+          <p:cNvPr id="213" name="Google Shape;213;g2847bb41301_0_38:notes"/>
           <p:cNvSpPr/>
           <p:nvPr>
             <p:ph idx="2" type="sldImg"/>
@@ -2283,7 +2284,7 @@
   <p:cSld>
     <p:spTree>
       <p:nvGrpSpPr>
-        <p:cNvPr id="219" name="Shape 219"/>
+        <p:cNvPr id="218" name="Shape 218"/>
         <p:cNvGrpSpPr/>
         <p:nvPr/>
       </p:nvGrpSpPr>
@@ -2297,7 +2298,7 @@
       </p:grpSpPr>
       <p:sp>
         <p:nvSpPr>
-          <p:cNvPr id="220" name="Google Shape;220;g2847bb41301_0_46:notes"/>
+          <p:cNvPr id="219" name="Google Shape;219;g2847bb41301_0_46:notes"/>
           <p:cNvSpPr txBox="1"/>
           <p:nvPr>
             <p:ph idx="1" type="body"/>
@@ -2336,7 +2337,7 @@
       </p:sp>
       <p:sp>
         <p:nvSpPr>
-          <p:cNvPr id="221" name="Google Shape;221;g2847bb41301_0_46:notes"/>
+          <p:cNvPr id="220" name="Google Shape;220;g2847bb41301_0_46:notes"/>
           <p:cNvSpPr/>
           <p:nvPr>
             <p:ph idx="2" type="sldImg"/>
@@ -2382,7 +2383,7 @@
   <p:cSld>
     <p:spTree>
       <p:nvGrpSpPr>
-        <p:cNvPr id="227" name="Shape 227"/>
+        <p:cNvPr id="226" name="Shape 226"/>
         <p:cNvGrpSpPr/>
         <p:nvPr/>
       </p:nvGrpSpPr>
@@ -2396,7 +2397,7 @@
       </p:grpSpPr>
       <p:sp>
         <p:nvSpPr>
-          <p:cNvPr id="228" name="Google Shape;228;g2847bb41301_0_53:notes"/>
+          <p:cNvPr id="227" name="Google Shape;227;g2847bb41301_0_53:notes"/>
           <p:cNvSpPr txBox="1"/>
           <p:nvPr>
             <p:ph idx="1" type="body"/>
@@ -2435,7 +2436,106 @@
       </p:sp>
       <p:sp>
         <p:nvSpPr>
-          <p:cNvPr id="229" name="Google Shape;229;g2847bb41301_0_53:notes"/>
+          <p:cNvPr id="228" name="Google Shape;228;g2847bb41301_0_53:notes"/>
+          <p:cNvSpPr/>
+          <p:nvPr>
+            <p:ph idx="2" type="sldImg"/>
+          </p:nvPr>
+        </p:nvSpPr>
+        <p:spPr>
+          <a:xfrm>
+            <a:off x="1295650" y="754375"/>
+            <a:ext cx="5181900" cy="3771900"/>
+          </a:xfrm>
+          <a:custGeom>
+            <a:rect b="b" l="l" r="r" t="t"/>
+            <a:pathLst>
+              <a:path extrusionOk="0" h="120000" w="120000">
+                <a:moveTo>
+                  <a:pt x="0" y="0"/>
+                </a:moveTo>
+                <a:lnTo>
+                  <a:pt x="120000" y="0"/>
+                </a:lnTo>
+                <a:lnTo>
+                  <a:pt x="120000" y="120000"/>
+                </a:lnTo>
+                <a:lnTo>
+                  <a:pt x="0" y="120000"/>
+                </a:lnTo>
+                <a:close/>
+              </a:path>
+            </a:pathLst>
+          </a:custGeom>
+        </p:spPr>
+      </p:sp>
+    </p:spTree>
+  </p:cSld>
+  <p:clrMapOvr>
+    <a:masterClrMapping/>
+  </p:clrMapOvr>
+</p:notes>
+</file>
+
+<file path=ppt/notesSlides/notesSlide26.xml><?xml version="1.0" encoding="utf-8"?>
+<p:notes xmlns:a="http://schemas.openxmlformats.org/drawingml/2006/main" xmlns:r="http://schemas.openxmlformats.org/officeDocument/2006/relationships" xmlns:mc="http://schemas.openxmlformats.org/markup-compatibility/2006" xmlns:mv="urn:schemas-microsoft-com:mac:vml" xmlns:p="http://schemas.openxmlformats.org/presentationml/2006/main" xmlns:c="http://schemas.openxmlformats.org/drawingml/2006/chart" xmlns:dgm="http://schemas.openxmlformats.org/drawingml/2006/diagram" xmlns:o="urn:schemas-microsoft-com:office:office" xmlns:v="urn:schemas-microsoft-com:vml" xmlns:pvml="urn:schemas-microsoft-com:office:powerpoint" xmlns:com="http://schemas.openxmlformats.org/drawingml/2006/compatibility" xmlns:p14="http://schemas.microsoft.com/office/powerpoint/2010/main" xmlns:p15="http://schemas.microsoft.com/office/powerpoint/2012/main" xmlns:ahyp="http://schemas.microsoft.com/office/drawing/2018/hyperlinkcolor" showMasterPhAnim="0" showMasterSp="0">
+  <p:cSld>
+    <p:spTree>
+      <p:nvGrpSpPr>
+        <p:cNvPr id="233" name="Shape 233"/>
+        <p:cNvGrpSpPr/>
+        <p:nvPr/>
+      </p:nvGrpSpPr>
+      <p:grpSpPr>
+        <a:xfrm>
+          <a:off x="0" y="0"/>
+          <a:ext cx="0" cy="0"/>
+          <a:chOff x="0" y="0"/>
+          <a:chExt cx="0" cy="0"/>
+        </a:xfrm>
+      </p:grpSpPr>
+      <p:sp>
+        <p:nvSpPr>
+          <p:cNvPr id="234" name="Google Shape;234;g284e3bcaa88_0_0:notes"/>
+          <p:cNvSpPr txBox="1"/>
+          <p:nvPr>
+            <p:ph idx="1" type="body"/>
+          </p:nvPr>
+        </p:nvSpPr>
+        <p:spPr>
+          <a:xfrm>
+            <a:off x="777225" y="4777725"/>
+            <a:ext cx="6217800" cy="4526400"/>
+          </a:xfrm>
+          <a:prstGeom prst="rect">
+            <a:avLst/>
+          </a:prstGeom>
+        </p:spPr>
+        <p:txBody>
+          <a:bodyPr anchorCtr="0" anchor="t" bIns="91425" lIns="91425" spcFirstLastPara="1" rIns="91425" wrap="square" tIns="91425">
+            <a:noAutofit/>
+          </a:bodyPr>
+          <a:lstStyle/>
+          <a:p>
+            <a:pPr indent="0" lvl="0" marL="0" rtl="0" algn="l">
+              <a:spcBef>
+                <a:spcPts val="0"/>
+              </a:spcBef>
+              <a:spcAft>
+                <a:spcPts val="0"/>
+              </a:spcAft>
+              <a:buNone/>
+            </a:pPr>
+            <a:r>
+              <a:t/>
+            </a:r>
+            <a:endParaRPr/>
+          </a:p>
+        </p:txBody>
+      </p:sp>
+      <p:sp>
+        <p:nvSpPr>
+          <p:cNvPr id="235" name="Google Shape;235;g284e3bcaa88_0_0:notes"/>
           <p:cNvSpPr/>
           <p:nvPr>
             <p:ph idx="2" type="sldImg"/>
@@ -2481,7 +2581,7 @@
   <p:cSld>
     <p:spTree>
       <p:nvGrpSpPr>
-        <p:cNvPr id="72" name="Shape 72"/>
+        <p:cNvPr id="71" name="Shape 71"/>
         <p:cNvGrpSpPr/>
         <p:nvPr/>
       </p:nvGrpSpPr>
@@ -2495,7 +2595,7 @@
       </p:grpSpPr>
       <p:sp>
         <p:nvSpPr>
-          <p:cNvPr id="73" name="Google Shape;73;p3:notes"/>
+          <p:cNvPr id="72" name="Google Shape;72;p3:notes"/>
           <p:cNvSpPr txBox="1"/>
           <p:nvPr>
             <p:ph idx="1" type="body"/>
@@ -2534,7 +2634,7 @@
       </p:sp>
       <p:sp>
         <p:nvSpPr>
-          <p:cNvPr id="74" name="Google Shape;74;p3:notes"/>
+          <p:cNvPr id="73" name="Google Shape;73;p3:notes"/>
           <p:cNvSpPr/>
           <p:nvPr>
             <p:ph idx="2" type="sldImg"/>
@@ -2580,7 +2680,7 @@
   <p:cSld>
     <p:spTree>
       <p:nvGrpSpPr>
-        <p:cNvPr id="78" name="Shape 78"/>
+        <p:cNvPr id="77" name="Shape 77"/>
         <p:cNvGrpSpPr/>
         <p:nvPr/>
       </p:nvGrpSpPr>
@@ -2594,7 +2694,7 @@
       </p:grpSpPr>
       <p:sp>
         <p:nvSpPr>
-          <p:cNvPr id="79" name="Google Shape;79;p5:notes"/>
+          <p:cNvPr id="78" name="Google Shape;78;p5:notes"/>
           <p:cNvSpPr txBox="1"/>
           <p:nvPr>
             <p:ph idx="1" type="body"/>
@@ -2633,7 +2733,7 @@
       </p:sp>
       <p:sp>
         <p:nvSpPr>
-          <p:cNvPr id="80" name="Google Shape;80;p5:notes"/>
+          <p:cNvPr id="79" name="Google Shape;79;p5:notes"/>
           <p:cNvSpPr/>
           <p:nvPr>
             <p:ph idx="2" type="sldImg"/>
@@ -2679,7 +2779,7 @@
   <p:cSld>
     <p:spTree>
       <p:nvGrpSpPr>
-        <p:cNvPr id="85" name="Shape 85"/>
+        <p:cNvPr id="84" name="Shape 84"/>
         <p:cNvGrpSpPr/>
         <p:nvPr/>
       </p:nvGrpSpPr>
@@ -2693,7 +2793,7 @@
       </p:grpSpPr>
       <p:sp>
         <p:nvSpPr>
-          <p:cNvPr id="86" name="Google Shape;86;g284d9d440f9_2_0:notes"/>
+          <p:cNvPr id="85" name="Google Shape;85;g284d9d440f9_2_0:notes"/>
           <p:cNvSpPr txBox="1"/>
           <p:nvPr>
             <p:ph idx="1" type="body"/>
@@ -2732,7 +2832,7 @@
       </p:sp>
       <p:sp>
         <p:nvSpPr>
-          <p:cNvPr id="87" name="Google Shape;87;g284d9d440f9_2_0:notes"/>
+          <p:cNvPr id="86" name="Google Shape;86;g284d9d440f9_2_0:notes"/>
           <p:cNvSpPr/>
           <p:nvPr>
             <p:ph idx="2" type="sldImg"/>
@@ -2778,7 +2878,7 @@
   <p:cSld>
     <p:spTree>
       <p:nvGrpSpPr>
-        <p:cNvPr id="93" name="Shape 93"/>
+        <p:cNvPr id="92" name="Shape 92"/>
         <p:cNvGrpSpPr/>
         <p:nvPr/>
       </p:nvGrpSpPr>
@@ -2792,7 +2892,7 @@
       </p:grpSpPr>
       <p:sp>
         <p:nvSpPr>
-          <p:cNvPr id="94" name="Google Shape;94;g28401714d72_0_0:notes"/>
+          <p:cNvPr id="93" name="Google Shape;93;g28401714d72_0_0:notes"/>
           <p:cNvSpPr txBox="1"/>
           <p:nvPr>
             <p:ph idx="1" type="body"/>
@@ -2831,7 +2931,7 @@
       </p:sp>
       <p:sp>
         <p:nvSpPr>
-          <p:cNvPr id="95" name="Google Shape;95;g28401714d72_0_0:notes"/>
+          <p:cNvPr id="94" name="Google Shape;94;g28401714d72_0_0:notes"/>
           <p:cNvSpPr/>
           <p:nvPr>
             <p:ph idx="2" type="sldImg"/>
@@ -2877,7 +2977,7 @@
   <p:cSld>
     <p:spTree>
       <p:nvGrpSpPr>
-        <p:cNvPr id="100" name="Shape 100"/>
+        <p:cNvPr id="99" name="Shape 99"/>
         <p:cNvGrpSpPr/>
         <p:nvPr/>
       </p:nvGrpSpPr>
@@ -2891,7 +2991,7 @@
       </p:grpSpPr>
       <p:sp>
         <p:nvSpPr>
-          <p:cNvPr id="101" name="Google Shape;101;g282cffbbf5b_0_0:notes"/>
+          <p:cNvPr id="100" name="Google Shape;100;g282cffbbf5b_0_0:notes"/>
           <p:cNvSpPr txBox="1"/>
           <p:nvPr>
             <p:ph idx="1" type="body"/>
@@ -2930,7 +3030,7 @@
       </p:sp>
       <p:sp>
         <p:nvSpPr>
-          <p:cNvPr id="102" name="Google Shape;102;g282cffbbf5b_0_0:notes"/>
+          <p:cNvPr id="101" name="Google Shape;101;g282cffbbf5b_0_0:notes"/>
           <p:cNvSpPr/>
           <p:nvPr>
             <p:ph idx="2" type="sldImg"/>
@@ -2976,7 +3076,7 @@
   <p:cSld>
     <p:spTree>
       <p:nvGrpSpPr>
-        <p:cNvPr id="107" name="Shape 107"/>
+        <p:cNvPr id="106" name="Shape 106"/>
         <p:cNvGrpSpPr/>
         <p:nvPr/>
       </p:nvGrpSpPr>
@@ -2990,7 +3090,7 @@
       </p:grpSpPr>
       <p:sp>
         <p:nvSpPr>
-          <p:cNvPr id="108" name="Google Shape;108;g282788f438d_0_0:notes"/>
+          <p:cNvPr id="107" name="Google Shape;107;g282788f438d_0_0:notes"/>
           <p:cNvSpPr txBox="1"/>
           <p:nvPr>
             <p:ph idx="1" type="body"/>
@@ -3029,7 +3129,7 @@
       </p:sp>
       <p:sp>
         <p:nvSpPr>
-          <p:cNvPr id="109" name="Google Shape;109;g282788f438d_0_0:notes"/>
+          <p:cNvPr id="108" name="Google Shape;108;g282788f438d_0_0:notes"/>
           <p:cNvSpPr/>
           <p:nvPr>
             <p:ph idx="2" type="sldImg"/>
@@ -3075,7 +3175,7 @@
   <p:cSld>
     <p:spTree>
       <p:nvGrpSpPr>
-        <p:cNvPr id="114" name="Shape 114"/>
+        <p:cNvPr id="113" name="Shape 113"/>
         <p:cNvGrpSpPr/>
         <p:nvPr/>
       </p:nvGrpSpPr>
@@ -3089,7 +3189,7 @@
       </p:grpSpPr>
       <p:sp>
         <p:nvSpPr>
-          <p:cNvPr id="115" name="Google Shape;115;g28401714d72_0_6:notes"/>
+          <p:cNvPr id="114" name="Google Shape;114;g28401714d72_0_6:notes"/>
           <p:cNvSpPr txBox="1"/>
           <p:nvPr>
             <p:ph idx="1" type="body"/>
@@ -3128,7 +3228,7 @@
       </p:sp>
       <p:sp>
         <p:nvSpPr>
-          <p:cNvPr id="116" name="Google Shape;116;g28401714d72_0_6:notes"/>
+          <p:cNvPr id="115" name="Google Shape;115;g28401714d72_0_6:notes"/>
           <p:cNvSpPr/>
           <p:nvPr>
             <p:ph idx="2" type="sldImg"/>
@@ -9209,44 +9309,18 @@
           <p:cNvPicPr preferRelativeResize="0"/>
           <p:nvPr/>
         </p:nvPicPr>
-        <p:blipFill rotWithShape="1">
+        <p:blipFill>
           <a:blip r:embed="rId3">
             <a:alphaModFix/>
           </a:blip>
-          <a:srcRect b="0" l="0" r="0" t="0"/>
-          <a:stretch/>
-        </p:blipFill>
-        <p:spPr>
-          <a:xfrm>
-            <a:off x="6120" y="0"/>
-            <a:ext cx="9142920" cy="5142240"/>
-          </a:xfrm>
-          <a:prstGeom prst="rect">
-            <a:avLst/>
-          </a:prstGeom>
-          <a:noFill/>
-          <a:ln>
-            <a:noFill/>
-          </a:ln>
-        </p:spPr>
-      </p:pic>
-      <p:pic>
-        <p:nvPicPr>
-          <p:cNvPr id="64" name="Google Shape;64;p14"/>
-          <p:cNvPicPr preferRelativeResize="0"/>
-          <p:nvPr/>
-        </p:nvPicPr>
-        <p:blipFill rotWithShape="1">
-          <a:blip r:embed="rId4">
-            <a:alphaModFix/>
-          </a:blip>
-          <a:srcRect b="0" l="0" r="0" t="0"/>
-          <a:stretch/>
+          <a:stretch>
+            <a:fillRect/>
+          </a:stretch>
         </p:blipFill>
         <p:spPr>
           <a:xfrm>
             <a:off x="0" y="0"/>
-            <a:ext cx="9143280" cy="5142960"/>
+            <a:ext cx="9143990" cy="5143500"/>
           </a:xfrm>
           <a:prstGeom prst="rect">
             <a:avLst/>
@@ -9270,7 +9344,7 @@
   <p:cSld>
     <p:spTree>
       <p:nvGrpSpPr>
-        <p:cNvPr id="124" name="Shape 124"/>
+        <p:cNvPr id="123" name="Shape 123"/>
         <p:cNvGrpSpPr/>
         <p:nvPr/>
       </p:nvGrpSpPr>
@@ -9284,7 +9358,7 @@
       </p:grpSpPr>
       <p:sp>
         <p:nvSpPr>
-          <p:cNvPr id="125" name="Google Shape;125;p23"/>
+          <p:cNvPr id="124" name="Google Shape;124;p23"/>
           <p:cNvSpPr/>
           <p:nvPr/>
         </p:nvSpPr>
@@ -9342,7 +9416,7 @@
       </p:sp>
       <p:sp>
         <p:nvSpPr>
-          <p:cNvPr id="126" name="Google Shape;126;p23"/>
+          <p:cNvPr id="125" name="Google Shape;125;p23"/>
           <p:cNvSpPr/>
           <p:nvPr/>
         </p:nvSpPr>
@@ -9378,7 +9452,7 @@
       </p:sp>
       <p:pic>
         <p:nvPicPr>
-          <p:cNvPr id="127" name="Google Shape;127;p23"/>
+          <p:cNvPr id="126" name="Google Shape;126;p23"/>
           <p:cNvPicPr preferRelativeResize="0"/>
           <p:nvPr/>
         </p:nvPicPr>
@@ -9417,7 +9491,7 @@
   <p:cSld>
     <p:spTree>
       <p:nvGrpSpPr>
-        <p:cNvPr id="131" name="Shape 131"/>
+        <p:cNvPr id="130" name="Shape 130"/>
         <p:cNvGrpSpPr/>
         <p:nvPr/>
       </p:nvGrpSpPr>
@@ -9431,7 +9505,7 @@
       </p:grpSpPr>
       <p:sp>
         <p:nvSpPr>
-          <p:cNvPr id="132" name="Google Shape;132;p24"/>
+          <p:cNvPr id="131" name="Google Shape;131;p24"/>
           <p:cNvSpPr/>
           <p:nvPr/>
         </p:nvSpPr>
@@ -9489,7 +9563,7 @@
       </p:sp>
       <p:sp>
         <p:nvSpPr>
-          <p:cNvPr id="133" name="Google Shape;133;p24"/>
+          <p:cNvPr id="132" name="Google Shape;132;p24"/>
           <p:cNvSpPr/>
           <p:nvPr/>
         </p:nvSpPr>
@@ -9880,7 +9954,7 @@
       </p:sp>
       <p:sp>
         <p:nvSpPr>
-          <p:cNvPr id="134" name="Google Shape;134;p24"/>
+          <p:cNvPr id="133" name="Google Shape;133;p24"/>
           <p:cNvSpPr/>
           <p:nvPr/>
         </p:nvSpPr>
@@ -9927,7 +10001,7 @@
   <p:cSld>
     <p:spTree>
       <p:nvGrpSpPr>
-        <p:cNvPr id="138" name="Shape 138"/>
+        <p:cNvPr id="137" name="Shape 137"/>
         <p:cNvGrpSpPr/>
         <p:nvPr/>
       </p:nvGrpSpPr>
@@ -9941,7 +10015,7 @@
       </p:grpSpPr>
       <p:sp>
         <p:nvSpPr>
-          <p:cNvPr id="139" name="Google Shape;139;p25"/>
+          <p:cNvPr id="138" name="Google Shape;138;p25"/>
           <p:cNvSpPr/>
           <p:nvPr/>
         </p:nvSpPr>
@@ -9999,7 +10073,7 @@
       </p:sp>
       <p:sp>
         <p:nvSpPr>
-          <p:cNvPr id="140" name="Google Shape;140;p25"/>
+          <p:cNvPr id="139" name="Google Shape;139;p25"/>
           <p:cNvSpPr/>
           <p:nvPr/>
         </p:nvSpPr>
@@ -10035,7 +10109,7 @@
       </p:sp>
       <p:pic>
         <p:nvPicPr>
-          <p:cNvPr id="141" name="Google Shape;141;p25"/>
+          <p:cNvPr id="140" name="Google Shape;140;p25"/>
           <p:cNvPicPr preferRelativeResize="0"/>
           <p:nvPr/>
         </p:nvPicPr>
@@ -10074,7 +10148,7 @@
   <p:cSld>
     <p:spTree>
       <p:nvGrpSpPr>
-        <p:cNvPr id="145" name="Shape 145"/>
+        <p:cNvPr id="144" name="Shape 144"/>
         <p:cNvGrpSpPr/>
         <p:nvPr/>
       </p:nvGrpSpPr>
@@ -10088,7 +10162,7 @@
       </p:grpSpPr>
       <p:sp>
         <p:nvSpPr>
-          <p:cNvPr id="146" name="Google Shape;146;p26"/>
+          <p:cNvPr id="145" name="Google Shape;145;p26"/>
           <p:cNvSpPr/>
           <p:nvPr/>
         </p:nvSpPr>
@@ -10146,7 +10220,7 @@
       </p:sp>
       <p:sp>
         <p:nvSpPr>
-          <p:cNvPr id="147" name="Google Shape;147;p26"/>
+          <p:cNvPr id="146" name="Google Shape;146;p26"/>
           <p:cNvSpPr/>
           <p:nvPr/>
         </p:nvSpPr>
@@ -10479,7 +10553,7 @@
       </p:sp>
       <p:sp>
         <p:nvSpPr>
-          <p:cNvPr id="148" name="Google Shape;148;p26"/>
+          <p:cNvPr id="147" name="Google Shape;147;p26"/>
           <p:cNvSpPr/>
           <p:nvPr/>
         </p:nvSpPr>
@@ -10526,7 +10600,7 @@
   <p:cSld>
     <p:spTree>
       <p:nvGrpSpPr>
-        <p:cNvPr id="152" name="Shape 152"/>
+        <p:cNvPr id="151" name="Shape 151"/>
         <p:cNvGrpSpPr/>
         <p:nvPr/>
       </p:nvGrpSpPr>
@@ -10540,7 +10614,7 @@
       </p:grpSpPr>
       <p:sp>
         <p:nvSpPr>
-          <p:cNvPr id="153" name="Google Shape;153;p27"/>
+          <p:cNvPr id="152" name="Google Shape;152;p27"/>
           <p:cNvSpPr/>
           <p:nvPr/>
         </p:nvSpPr>
@@ -10598,7 +10672,7 @@
       </p:sp>
       <p:sp>
         <p:nvSpPr>
-          <p:cNvPr id="154" name="Google Shape;154;p27"/>
+          <p:cNvPr id="153" name="Google Shape;153;p27"/>
           <p:cNvSpPr/>
           <p:nvPr/>
         </p:nvSpPr>
@@ -10634,7 +10708,7 @@
       </p:sp>
       <p:pic>
         <p:nvPicPr>
-          <p:cNvPr id="155" name="Google Shape;155;p27"/>
+          <p:cNvPr id="154" name="Google Shape;154;p27"/>
           <p:cNvPicPr preferRelativeResize="0"/>
           <p:nvPr/>
         </p:nvPicPr>
@@ -10673,7 +10747,7 @@
   <p:cSld>
     <p:spTree>
       <p:nvGrpSpPr>
-        <p:cNvPr id="159" name="Shape 159"/>
+        <p:cNvPr id="158" name="Shape 158"/>
         <p:cNvGrpSpPr/>
         <p:nvPr/>
       </p:nvGrpSpPr>
@@ -10687,7 +10761,7 @@
       </p:grpSpPr>
       <p:sp>
         <p:nvSpPr>
-          <p:cNvPr id="160" name="Google Shape;160;p28"/>
+          <p:cNvPr id="159" name="Google Shape;159;p28"/>
           <p:cNvSpPr/>
           <p:nvPr/>
         </p:nvSpPr>
@@ -10745,7 +10819,7 @@
       </p:sp>
       <p:sp>
         <p:nvSpPr>
-          <p:cNvPr id="161" name="Google Shape;161;p28"/>
+          <p:cNvPr id="160" name="Google Shape;160;p28"/>
           <p:cNvSpPr/>
           <p:nvPr/>
         </p:nvSpPr>
@@ -11078,7 +11152,7 @@
       </p:sp>
       <p:sp>
         <p:nvSpPr>
-          <p:cNvPr id="162" name="Google Shape;162;p28"/>
+          <p:cNvPr id="161" name="Google Shape;161;p28"/>
           <p:cNvSpPr/>
           <p:nvPr/>
         </p:nvSpPr>
@@ -11125,7 +11199,7 @@
   <p:cSld>
     <p:spTree>
       <p:nvGrpSpPr>
-        <p:cNvPr id="166" name="Shape 166"/>
+        <p:cNvPr id="165" name="Shape 165"/>
         <p:cNvGrpSpPr/>
         <p:nvPr/>
       </p:nvGrpSpPr>
@@ -11139,7 +11213,7 @@
       </p:grpSpPr>
       <p:sp>
         <p:nvSpPr>
-          <p:cNvPr id="167" name="Google Shape;167;p29"/>
+          <p:cNvPr id="166" name="Google Shape;166;p29"/>
           <p:cNvSpPr/>
           <p:nvPr/>
         </p:nvSpPr>
@@ -11197,7 +11271,7 @@
       </p:sp>
       <p:sp>
         <p:nvSpPr>
-          <p:cNvPr id="168" name="Google Shape;168;p29"/>
+          <p:cNvPr id="167" name="Google Shape;167;p29"/>
           <p:cNvSpPr/>
           <p:nvPr/>
         </p:nvSpPr>
@@ -11233,7 +11307,7 @@
       </p:sp>
       <p:pic>
         <p:nvPicPr>
-          <p:cNvPr id="169" name="Google Shape;169;p29"/>
+          <p:cNvPr id="168" name="Google Shape;168;p29"/>
           <p:cNvPicPr preferRelativeResize="0"/>
           <p:nvPr/>
         </p:nvPicPr>
@@ -11272,7 +11346,7 @@
   <p:cSld>
     <p:spTree>
       <p:nvGrpSpPr>
-        <p:cNvPr id="173" name="Shape 173"/>
+        <p:cNvPr id="172" name="Shape 172"/>
         <p:cNvGrpSpPr/>
         <p:nvPr/>
       </p:nvGrpSpPr>
@@ -11286,7 +11360,7 @@
       </p:grpSpPr>
       <p:sp>
         <p:nvSpPr>
-          <p:cNvPr id="174" name="Google Shape;174;p30"/>
+          <p:cNvPr id="173" name="Google Shape;173;p30"/>
           <p:cNvSpPr/>
           <p:nvPr/>
         </p:nvSpPr>
@@ -11344,7 +11418,7 @@
       </p:sp>
       <p:sp>
         <p:nvSpPr>
-          <p:cNvPr id="175" name="Google Shape;175;p30"/>
+          <p:cNvPr id="174" name="Google Shape;174;p30"/>
           <p:cNvSpPr/>
           <p:nvPr/>
         </p:nvSpPr>
@@ -11658,7 +11732,7 @@
       </p:sp>
       <p:sp>
         <p:nvSpPr>
-          <p:cNvPr id="176" name="Google Shape;176;p30"/>
+          <p:cNvPr id="175" name="Google Shape;175;p30"/>
           <p:cNvSpPr/>
           <p:nvPr/>
         </p:nvSpPr>
@@ -11705,7 +11779,7 @@
   <p:cSld>
     <p:spTree>
       <p:nvGrpSpPr>
-        <p:cNvPr id="180" name="Shape 180"/>
+        <p:cNvPr id="179" name="Shape 179"/>
         <p:cNvGrpSpPr/>
         <p:nvPr/>
       </p:nvGrpSpPr>
@@ -11719,7 +11793,7 @@
       </p:grpSpPr>
       <p:sp>
         <p:nvSpPr>
-          <p:cNvPr id="181" name="Google Shape;181;p31"/>
+          <p:cNvPr id="180" name="Google Shape;180;p31"/>
           <p:cNvSpPr/>
           <p:nvPr/>
         </p:nvSpPr>
@@ -11777,7 +11851,7 @@
       </p:sp>
       <p:sp>
         <p:nvSpPr>
-          <p:cNvPr id="182" name="Google Shape;182;p31"/>
+          <p:cNvPr id="181" name="Google Shape;181;p31"/>
           <p:cNvSpPr/>
           <p:nvPr/>
         </p:nvSpPr>
@@ -11813,7 +11887,7 @@
       </p:sp>
       <p:pic>
         <p:nvPicPr>
-          <p:cNvPr id="183" name="Google Shape;183;p31"/>
+          <p:cNvPr id="182" name="Google Shape;182;p31"/>
           <p:cNvPicPr preferRelativeResize="0"/>
           <p:nvPr/>
         </p:nvPicPr>
@@ -11852,7 +11926,7 @@
   <p:cSld>
     <p:spTree>
       <p:nvGrpSpPr>
-        <p:cNvPr id="187" name="Shape 187"/>
+        <p:cNvPr id="186" name="Shape 186"/>
         <p:cNvGrpSpPr/>
         <p:nvPr/>
       </p:nvGrpSpPr>
@@ -11866,7 +11940,7 @@
       </p:grpSpPr>
       <p:sp>
         <p:nvSpPr>
-          <p:cNvPr id="188" name="Google Shape;188;p32"/>
+          <p:cNvPr id="187" name="Google Shape;187;p32"/>
           <p:cNvSpPr/>
           <p:nvPr/>
         </p:nvSpPr>
@@ -11924,7 +11998,7 @@
       </p:sp>
       <p:sp>
         <p:nvSpPr>
-          <p:cNvPr id="189" name="Google Shape;189;p32"/>
+          <p:cNvPr id="188" name="Google Shape;188;p32"/>
           <p:cNvSpPr/>
           <p:nvPr/>
         </p:nvSpPr>
@@ -12289,7 +12363,7 @@
       </p:sp>
       <p:sp>
         <p:nvSpPr>
-          <p:cNvPr id="190" name="Google Shape;190;p32"/>
+          <p:cNvPr id="189" name="Google Shape;189;p32"/>
           <p:cNvSpPr/>
           <p:nvPr/>
         </p:nvSpPr>
@@ -12336,7 +12410,7 @@
   <p:cSld>
     <p:spTree>
       <p:nvGrpSpPr>
-        <p:cNvPr id="68" name="Shape 68"/>
+        <p:cNvPr id="67" name="Shape 67"/>
         <p:cNvGrpSpPr/>
         <p:nvPr/>
       </p:nvGrpSpPr>
@@ -12350,7 +12424,7 @@
       </p:grpSpPr>
       <p:sp>
         <p:nvSpPr>
-          <p:cNvPr id="69" name="Google Shape;69;p15"/>
+          <p:cNvPr id="68" name="Google Shape;68;p15"/>
           <p:cNvSpPr/>
           <p:nvPr/>
         </p:nvSpPr>
@@ -12408,7 +12482,7 @@
       </p:sp>
       <p:sp>
         <p:nvSpPr>
-          <p:cNvPr id="70" name="Google Shape;70;p15"/>
+          <p:cNvPr id="69" name="Google Shape;69;p15"/>
           <p:cNvSpPr/>
           <p:nvPr/>
         </p:nvSpPr>
@@ -12530,7 +12604,7 @@
       </p:sp>
       <p:sp>
         <p:nvSpPr>
-          <p:cNvPr id="71" name="Google Shape;71;p15"/>
+          <p:cNvPr id="70" name="Google Shape;70;p15"/>
           <p:cNvSpPr/>
           <p:nvPr/>
         </p:nvSpPr>
@@ -12577,7 +12651,7 @@
   <p:cSld>
     <p:spTree>
       <p:nvGrpSpPr>
-        <p:cNvPr id="194" name="Shape 194"/>
+        <p:cNvPr id="193" name="Shape 193"/>
         <p:cNvGrpSpPr/>
         <p:nvPr/>
       </p:nvGrpSpPr>
@@ -12591,7 +12665,7 @@
       </p:grpSpPr>
       <p:sp>
         <p:nvSpPr>
-          <p:cNvPr id="195" name="Google Shape;195;p33"/>
+          <p:cNvPr id="194" name="Google Shape;194;p33"/>
           <p:cNvSpPr/>
           <p:nvPr/>
         </p:nvSpPr>
@@ -12649,7 +12723,7 @@
       </p:sp>
       <p:sp>
         <p:nvSpPr>
-          <p:cNvPr id="196" name="Google Shape;196;p33"/>
+          <p:cNvPr id="195" name="Google Shape;195;p33"/>
           <p:cNvSpPr/>
           <p:nvPr/>
         </p:nvSpPr>
@@ -12685,7 +12759,7 @@
       </p:sp>
       <p:pic>
         <p:nvPicPr>
-          <p:cNvPr id="197" name="Google Shape;197;p33"/>
+          <p:cNvPr id="196" name="Google Shape;196;p33"/>
           <p:cNvPicPr preferRelativeResize="0"/>
           <p:nvPr/>
         </p:nvPicPr>
@@ -12724,7 +12798,7 @@
   <p:cSld>
     <p:spTree>
       <p:nvGrpSpPr>
-        <p:cNvPr id="201" name="Shape 201"/>
+        <p:cNvPr id="200" name="Shape 200"/>
         <p:cNvGrpSpPr/>
         <p:nvPr/>
       </p:nvGrpSpPr>
@@ -12738,7 +12812,7 @@
       </p:grpSpPr>
       <p:sp>
         <p:nvSpPr>
-          <p:cNvPr id="202" name="Google Shape;202;p34"/>
+          <p:cNvPr id="201" name="Google Shape;201;p34"/>
           <p:cNvSpPr/>
           <p:nvPr/>
         </p:nvSpPr>
@@ -12796,7 +12870,7 @@
       </p:sp>
       <p:sp>
         <p:nvSpPr>
-          <p:cNvPr id="203" name="Google Shape;203;p34"/>
+          <p:cNvPr id="202" name="Google Shape;202;p34"/>
           <p:cNvSpPr/>
           <p:nvPr/>
         </p:nvSpPr>
@@ -13125,7 +13199,7 @@
       </p:sp>
       <p:sp>
         <p:nvSpPr>
-          <p:cNvPr id="204" name="Google Shape;204;p34"/>
+          <p:cNvPr id="203" name="Google Shape;203;p34"/>
           <p:cNvSpPr/>
           <p:nvPr/>
         </p:nvSpPr>
@@ -13172,7 +13246,7 @@
   <p:cSld>
     <p:spTree>
       <p:nvGrpSpPr>
-        <p:cNvPr id="208" name="Shape 208"/>
+        <p:cNvPr id="207" name="Shape 207"/>
         <p:cNvGrpSpPr/>
         <p:nvPr/>
       </p:nvGrpSpPr>
@@ -13186,7 +13260,7 @@
       </p:grpSpPr>
       <p:sp>
         <p:nvSpPr>
-          <p:cNvPr id="209" name="Google Shape;209;p35"/>
+          <p:cNvPr id="208" name="Google Shape;208;p35"/>
           <p:cNvSpPr/>
           <p:nvPr/>
         </p:nvSpPr>
@@ -13244,7 +13318,7 @@
       </p:sp>
       <p:sp>
         <p:nvSpPr>
-          <p:cNvPr id="210" name="Google Shape;210;p35"/>
+          <p:cNvPr id="209" name="Google Shape;209;p35"/>
           <p:cNvSpPr/>
           <p:nvPr/>
         </p:nvSpPr>
@@ -13280,7 +13354,7 @@
       </p:sp>
       <p:pic>
         <p:nvPicPr>
-          <p:cNvPr id="211" name="Google Shape;211;p35"/>
+          <p:cNvPr id="210" name="Google Shape;210;p35"/>
           <p:cNvPicPr preferRelativeResize="0"/>
           <p:nvPr/>
         </p:nvPicPr>
@@ -13319,7 +13393,7 @@
   <p:cSld>
     <p:spTree>
       <p:nvGrpSpPr>
-        <p:cNvPr id="215" name="Shape 215"/>
+        <p:cNvPr id="214" name="Shape 214"/>
         <p:cNvGrpSpPr/>
         <p:nvPr/>
       </p:nvGrpSpPr>
@@ -13333,7 +13407,7 @@
       </p:grpSpPr>
       <p:sp>
         <p:nvSpPr>
-          <p:cNvPr id="216" name="Google Shape;216;p36"/>
+          <p:cNvPr id="215" name="Google Shape;215;p36"/>
           <p:cNvSpPr/>
           <p:nvPr/>
         </p:nvSpPr>
@@ -13392,7 +13466,7 @@
       </p:sp>
       <p:sp>
         <p:nvSpPr>
-          <p:cNvPr id="217" name="Google Shape;217;p36"/>
+          <p:cNvPr id="216" name="Google Shape;216;p36"/>
           <p:cNvSpPr/>
           <p:nvPr/>
         </p:nvSpPr>
@@ -13428,7 +13502,7 @@
       </p:sp>
       <p:sp>
         <p:nvSpPr>
-          <p:cNvPr id="218" name="Google Shape;218;p36"/>
+          <p:cNvPr id="217" name="Google Shape;217;p36"/>
           <p:cNvSpPr txBox="1"/>
           <p:nvPr/>
         </p:nvSpPr>
@@ -13581,7 +13655,7 @@
   <p:cSld>
     <p:spTree>
       <p:nvGrpSpPr>
-        <p:cNvPr id="222" name="Shape 222"/>
+        <p:cNvPr id="221" name="Shape 221"/>
         <p:cNvGrpSpPr/>
         <p:nvPr/>
       </p:nvGrpSpPr>
@@ -13595,7 +13669,7 @@
       </p:grpSpPr>
       <p:sp>
         <p:nvSpPr>
-          <p:cNvPr id="223" name="Google Shape;223;p37"/>
+          <p:cNvPr id="222" name="Google Shape;222;p37"/>
           <p:cNvSpPr/>
           <p:nvPr/>
         </p:nvSpPr>
@@ -13650,7 +13724,7 @@
       </p:sp>
       <p:sp>
         <p:nvSpPr>
-          <p:cNvPr id="224" name="Google Shape;224;p37"/>
+          <p:cNvPr id="223" name="Google Shape;223;p37"/>
           <p:cNvSpPr/>
           <p:nvPr/>
         </p:nvSpPr>
@@ -13686,7 +13760,7 @@
       </p:sp>
       <p:sp>
         <p:nvSpPr>
-          <p:cNvPr id="225" name="Google Shape;225;p37"/>
+          <p:cNvPr id="224" name="Google Shape;224;p37"/>
           <p:cNvSpPr txBox="1"/>
           <p:nvPr/>
         </p:nvSpPr>
@@ -13816,7 +13890,7 @@
       </p:sp>
       <p:pic>
         <p:nvPicPr>
-          <p:cNvPr id="226" name="Google Shape;226;p37"/>
+          <p:cNvPr id="225" name="Google Shape;225;p37"/>
           <p:cNvPicPr preferRelativeResize="0"/>
           <p:nvPr/>
         </p:nvPicPr>
@@ -13855,7 +13929,7 @@
   <p:cSld>
     <p:spTree>
       <p:nvGrpSpPr>
-        <p:cNvPr id="230" name="Shape 230"/>
+        <p:cNvPr id="229" name="Shape 229"/>
         <p:cNvGrpSpPr/>
         <p:nvPr/>
       </p:nvGrpSpPr>
@@ -13869,7 +13943,7 @@
       </p:grpSpPr>
       <p:sp>
         <p:nvSpPr>
-          <p:cNvPr id="231" name="Google Shape;231;p38"/>
+          <p:cNvPr id="230" name="Google Shape;230;p38"/>
           <p:cNvSpPr/>
           <p:nvPr/>
         </p:nvSpPr>
@@ -13939,7 +14013,7 @@
       </p:sp>
       <p:sp>
         <p:nvSpPr>
-          <p:cNvPr id="232" name="Google Shape;232;p38"/>
+          <p:cNvPr id="231" name="Google Shape;231;p38"/>
           <p:cNvSpPr/>
           <p:nvPr/>
         </p:nvSpPr>
@@ -13975,7 +14049,7 @@
       </p:sp>
       <p:sp>
         <p:nvSpPr>
-          <p:cNvPr id="233" name="Google Shape;233;p38"/>
+          <p:cNvPr id="232" name="Google Shape;232;p38"/>
           <p:cNvSpPr txBox="1"/>
           <p:nvPr/>
         </p:nvSpPr>
@@ -14108,12 +14182,12 @@
 </p:sld>
 </file>
 
-<file path=ppt/slides/slide3.xml><?xml version="1.0" encoding="utf-8"?>
+<file path=ppt/slides/slide26.xml><?xml version="1.0" encoding="utf-8"?>
 <p:sld xmlns:a="http://schemas.openxmlformats.org/drawingml/2006/main" xmlns:r="http://schemas.openxmlformats.org/officeDocument/2006/relationships" xmlns:mc="http://schemas.openxmlformats.org/markup-compatibility/2006" xmlns:mv="urn:schemas-microsoft-com:mac:vml" xmlns:p="http://schemas.openxmlformats.org/presentationml/2006/main" xmlns:c="http://schemas.openxmlformats.org/drawingml/2006/chart" xmlns:dgm="http://schemas.openxmlformats.org/drawingml/2006/diagram" xmlns:o="urn:schemas-microsoft-com:office:office" xmlns:v="urn:schemas-microsoft-com:vml" xmlns:pvml="urn:schemas-microsoft-com:office:powerpoint" xmlns:com="http://schemas.openxmlformats.org/drawingml/2006/compatibility" xmlns:p14="http://schemas.microsoft.com/office/powerpoint/2010/main" xmlns:p15="http://schemas.microsoft.com/office/powerpoint/2012/main" xmlns:ahyp="http://schemas.microsoft.com/office/drawing/2018/hyperlinkcolor">
   <p:cSld>
     <p:spTree>
       <p:nvGrpSpPr>
-        <p:cNvPr id="75" name="Shape 75"/>
+        <p:cNvPr id="236" name="Shape 236"/>
         <p:cNvGrpSpPr/>
         <p:nvPr/>
       </p:nvGrpSpPr>
@@ -14127,7 +14201,204 @@
       </p:grpSpPr>
       <p:sp>
         <p:nvSpPr>
-          <p:cNvPr id="76" name="Google Shape;76;p16"/>
+          <p:cNvPr id="237" name="Google Shape;237;p39"/>
+          <p:cNvSpPr/>
+          <p:nvPr/>
+        </p:nvSpPr>
+        <p:spPr>
+          <a:xfrm>
+            <a:off x="1188720" y="731520"/>
+            <a:ext cx="6490800" cy="730200"/>
+          </a:xfrm>
+          <a:prstGeom prst="rect">
+            <a:avLst/>
+          </a:prstGeom>
+          <a:noFill/>
+          <a:ln>
+            <a:noFill/>
+          </a:ln>
+        </p:spPr>
+        <p:txBody>
+          <a:bodyPr anchorCtr="0" anchor="ctr" bIns="0" lIns="0" spcFirstLastPara="1" rIns="0" wrap="square" tIns="0">
+            <a:noAutofit/>
+          </a:bodyPr>
+          <a:lstStyle/>
+          <a:p>
+            <a:pPr indent="0" lvl="0" marL="0" rtl="0" algn="ctr">
+              <a:spcBef>
+                <a:spcPts val="0"/>
+              </a:spcBef>
+              <a:spcAft>
+                <a:spcPts val="0"/>
+              </a:spcAft>
+              <a:buNone/>
+            </a:pPr>
+            <a:r>
+              <a:rPr lang="en-US" sz="2800">
+                <a:solidFill>
+                  <a:schemeClr val="dk1"/>
+                </a:solidFill>
+                <a:latin typeface="Calibri"/>
+                <a:ea typeface="Calibri"/>
+                <a:cs typeface="Calibri"/>
+                <a:sym typeface="Calibri"/>
+              </a:rPr>
+              <a:t>Find us on GitHub</a:t>
+            </a:r>
+            <a:endParaRPr sz="2800">
+              <a:solidFill>
+                <a:schemeClr val="dk1"/>
+              </a:solidFill>
+              <a:latin typeface="Calibri"/>
+              <a:ea typeface="Calibri"/>
+              <a:cs typeface="Calibri"/>
+              <a:sym typeface="Calibri"/>
+            </a:endParaRPr>
+          </a:p>
+        </p:txBody>
+      </p:sp>
+      <p:sp>
+        <p:nvSpPr>
+          <p:cNvPr id="238" name="Google Shape;238;p39"/>
+          <p:cNvSpPr/>
+          <p:nvPr/>
+        </p:nvSpPr>
+        <p:spPr>
+          <a:xfrm>
+            <a:off x="1005840" y="1371600"/>
+            <a:ext cx="6857298" cy="378"/>
+          </a:xfrm>
+          <a:custGeom>
+            <a:rect b="b" l="l" r="r" t="t"/>
+            <a:pathLst>
+              <a:path extrusionOk="0" h="21600" w="21600">
+                <a:moveTo>
+                  <a:pt x="0" y="0"/>
+                </a:moveTo>
+                <a:lnTo>
+                  <a:pt x="21600" y="21600"/>
+                </a:lnTo>
+              </a:path>
+            </a:pathLst>
+          </a:custGeom>
+          <a:noFill/>
+          <a:ln cap="flat" cmpd="sng" w="9525">
+            <a:solidFill>
+              <a:srgbClr val="E8A202"/>
+            </a:solidFill>
+            <a:prstDash val="solid"/>
+            <a:round/>
+            <a:headEnd len="sm" w="sm" type="none"/>
+            <a:tailEnd len="sm" w="sm" type="none"/>
+          </a:ln>
+        </p:spPr>
+      </p:sp>
+      <p:sp>
+        <p:nvSpPr>
+          <p:cNvPr id="239" name="Google Shape;239;p39"/>
+          <p:cNvSpPr txBox="1"/>
+          <p:nvPr/>
+        </p:nvSpPr>
+        <p:spPr>
+          <a:xfrm>
+            <a:off x="1362850" y="1461725"/>
+            <a:ext cx="6992700" cy="461700"/>
+          </a:xfrm>
+          <a:prstGeom prst="rect">
+            <a:avLst/>
+          </a:prstGeom>
+          <a:noFill/>
+          <a:ln>
+            <a:noFill/>
+          </a:ln>
+        </p:spPr>
+        <p:txBody>
+          <a:bodyPr anchorCtr="0" anchor="t" bIns="91425" lIns="91425" spcFirstLastPara="1" rIns="91425" wrap="square" tIns="91425">
+            <a:spAutoFit/>
+          </a:bodyPr>
+          <a:lstStyle/>
+          <a:p>
+            <a:pPr indent="0" lvl="0" marL="0" rtl="0" algn="l">
+              <a:spcBef>
+                <a:spcPts val="0"/>
+              </a:spcBef>
+              <a:spcAft>
+                <a:spcPts val="0"/>
+              </a:spcAft>
+              <a:buNone/>
+            </a:pPr>
+            <a:r>
+              <a:rPr lang="en-US" sz="1800">
+                <a:solidFill>
+                  <a:srgbClr val="808080"/>
+                </a:solidFill>
+              </a:rPr>
+              <a:t>https://github.com/kentbutler/climate-data-model</a:t>
+            </a:r>
+            <a:endParaRPr sz="1800">
+              <a:solidFill>
+                <a:srgbClr val="808080"/>
+              </a:solidFill>
+            </a:endParaRPr>
+          </a:p>
+        </p:txBody>
+      </p:sp>
+      <p:pic>
+        <p:nvPicPr>
+          <p:cNvPr id="240" name="Google Shape;240;p39"/>
+          <p:cNvPicPr preferRelativeResize="0"/>
+          <p:nvPr/>
+        </p:nvPicPr>
+        <p:blipFill>
+          <a:blip r:embed="rId3">
+            <a:alphaModFix/>
+          </a:blip>
+          <a:stretch>
+            <a:fillRect/>
+          </a:stretch>
+        </p:blipFill>
+        <p:spPr>
+          <a:xfrm>
+            <a:off x="2389100" y="1884350"/>
+            <a:ext cx="3834933" cy="2915276"/>
+          </a:xfrm>
+          <a:prstGeom prst="rect">
+            <a:avLst/>
+          </a:prstGeom>
+          <a:noFill/>
+          <a:ln>
+            <a:noFill/>
+          </a:ln>
+        </p:spPr>
+      </p:pic>
+    </p:spTree>
+  </p:cSld>
+  <p:clrMapOvr>
+    <a:masterClrMapping/>
+  </p:clrMapOvr>
+</p:sld>
+</file>
+
+<file path=ppt/slides/slide3.xml><?xml version="1.0" encoding="utf-8"?>
+<p:sld xmlns:a="http://schemas.openxmlformats.org/drawingml/2006/main" xmlns:r="http://schemas.openxmlformats.org/officeDocument/2006/relationships" xmlns:mc="http://schemas.openxmlformats.org/markup-compatibility/2006" xmlns:mv="urn:schemas-microsoft-com:mac:vml" xmlns:p="http://schemas.openxmlformats.org/presentationml/2006/main" xmlns:c="http://schemas.openxmlformats.org/drawingml/2006/chart" xmlns:dgm="http://schemas.openxmlformats.org/drawingml/2006/diagram" xmlns:o="urn:schemas-microsoft-com:office:office" xmlns:v="urn:schemas-microsoft-com:vml" xmlns:pvml="urn:schemas-microsoft-com:office:powerpoint" xmlns:com="http://schemas.openxmlformats.org/drawingml/2006/compatibility" xmlns:p14="http://schemas.microsoft.com/office/powerpoint/2010/main" xmlns:p15="http://schemas.microsoft.com/office/powerpoint/2012/main" xmlns:ahyp="http://schemas.microsoft.com/office/drawing/2018/hyperlinkcolor">
+  <p:cSld>
+    <p:spTree>
+      <p:nvGrpSpPr>
+        <p:cNvPr id="74" name="Shape 74"/>
+        <p:cNvGrpSpPr/>
+        <p:nvPr/>
+      </p:nvGrpSpPr>
+      <p:grpSpPr>
+        <a:xfrm>
+          <a:off x="0" y="0"/>
+          <a:ext cx="0" cy="0"/>
+          <a:chOff x="0" y="0"/>
+          <a:chExt cx="0" cy="0"/>
+        </a:xfrm>
+      </p:grpSpPr>
+      <p:sp>
+        <p:nvSpPr>
+          <p:cNvPr id="75" name="Google Shape;75;p16"/>
           <p:cNvSpPr/>
           <p:nvPr/>
         </p:nvSpPr>
@@ -14185,7 +14456,7 @@
       </p:sp>
       <p:sp>
         <p:nvSpPr>
-          <p:cNvPr id="77" name="Google Shape;77;p16"/>
+          <p:cNvPr id="76" name="Google Shape;76;p16"/>
           <p:cNvSpPr/>
           <p:nvPr/>
         </p:nvSpPr>
@@ -14661,7 +14932,7 @@
   <p:cSld>
     <p:spTree>
       <p:nvGrpSpPr>
-        <p:cNvPr id="81" name="Shape 81"/>
+        <p:cNvPr id="80" name="Shape 80"/>
         <p:cNvGrpSpPr/>
         <p:nvPr/>
       </p:nvGrpSpPr>
@@ -14675,7 +14946,7 @@
       </p:grpSpPr>
       <p:sp>
         <p:nvSpPr>
-          <p:cNvPr id="82" name="Google Shape;82;p17"/>
+          <p:cNvPr id="81" name="Google Shape;81;p17"/>
           <p:cNvSpPr/>
           <p:nvPr/>
         </p:nvSpPr>
@@ -14730,7 +15001,7 @@
       </p:sp>
       <p:sp>
         <p:nvSpPr>
-          <p:cNvPr id="83" name="Google Shape;83;p17"/>
+          <p:cNvPr id="82" name="Google Shape;82;p17"/>
           <p:cNvSpPr/>
           <p:nvPr/>
         </p:nvSpPr>
@@ -14821,7 +15092,7 @@
       </p:sp>
       <p:sp>
         <p:nvSpPr>
-          <p:cNvPr id="84" name="Google Shape;84;p17"/>
+          <p:cNvPr id="83" name="Google Shape;83;p17"/>
           <p:cNvSpPr/>
           <p:nvPr/>
         </p:nvSpPr>
@@ -14868,7 +15139,7 @@
   <p:cSld>
     <p:spTree>
       <p:nvGrpSpPr>
-        <p:cNvPr id="88" name="Shape 88"/>
+        <p:cNvPr id="87" name="Shape 87"/>
         <p:cNvGrpSpPr/>
         <p:nvPr/>
       </p:nvGrpSpPr>
@@ -14882,7 +15153,7 @@
       </p:grpSpPr>
       <p:sp>
         <p:nvSpPr>
-          <p:cNvPr id="89" name="Google Shape;89;p18"/>
+          <p:cNvPr id="88" name="Google Shape;88;p18"/>
           <p:cNvSpPr/>
           <p:nvPr/>
         </p:nvSpPr>
@@ -14937,7 +15208,7 @@
       </p:sp>
       <p:sp>
         <p:nvSpPr>
-          <p:cNvPr id="90" name="Google Shape;90;p18"/>
+          <p:cNvPr id="89" name="Google Shape;89;p18"/>
           <p:cNvSpPr/>
           <p:nvPr/>
         </p:nvSpPr>
@@ -15369,7 +15640,7 @@
       </p:sp>
       <p:sp>
         <p:nvSpPr>
-          <p:cNvPr id="91" name="Google Shape;91;p18"/>
+          <p:cNvPr id="90" name="Google Shape;90;p18"/>
           <p:cNvSpPr/>
           <p:nvPr/>
         </p:nvSpPr>
@@ -15405,7 +15676,7 @@
       </p:sp>
       <p:pic>
         <p:nvPicPr>
-          <p:cNvPr id="92" name="Google Shape;92;p18"/>
+          <p:cNvPr id="91" name="Google Shape;91;p18"/>
           <p:cNvPicPr preferRelativeResize="0"/>
           <p:nvPr/>
         </p:nvPicPr>
@@ -15444,7 +15715,7 @@
   <p:cSld>
     <p:spTree>
       <p:nvGrpSpPr>
-        <p:cNvPr id="96" name="Shape 96"/>
+        <p:cNvPr id="95" name="Shape 95"/>
         <p:cNvGrpSpPr/>
         <p:nvPr/>
       </p:nvGrpSpPr>
@@ -15458,7 +15729,7 @@
       </p:grpSpPr>
       <p:sp>
         <p:nvSpPr>
-          <p:cNvPr id="97" name="Google Shape;97;p19"/>
+          <p:cNvPr id="96" name="Google Shape;96;p19"/>
           <p:cNvSpPr/>
           <p:nvPr/>
         </p:nvSpPr>
@@ -15513,7 +15784,7 @@
       </p:sp>
       <p:sp>
         <p:nvSpPr>
-          <p:cNvPr id="98" name="Google Shape;98;p19"/>
+          <p:cNvPr id="97" name="Google Shape;97;p19"/>
           <p:cNvSpPr/>
           <p:nvPr/>
         </p:nvSpPr>
@@ -15642,7 +15913,7 @@
       </p:sp>
       <p:sp>
         <p:nvSpPr>
-          <p:cNvPr id="99" name="Google Shape;99;p19"/>
+          <p:cNvPr id="98" name="Google Shape;98;p19"/>
           <p:cNvSpPr/>
           <p:nvPr/>
         </p:nvSpPr>
@@ -15689,7 +15960,7 @@
   <p:cSld>
     <p:spTree>
       <p:nvGrpSpPr>
-        <p:cNvPr id="103" name="Shape 103"/>
+        <p:cNvPr id="102" name="Shape 102"/>
         <p:cNvGrpSpPr/>
         <p:nvPr/>
       </p:nvGrpSpPr>
@@ -15703,7 +15974,7 @@
       </p:grpSpPr>
       <p:sp>
         <p:nvSpPr>
-          <p:cNvPr id="104" name="Google Shape;104;p20"/>
+          <p:cNvPr id="103" name="Google Shape;103;p20"/>
           <p:cNvSpPr/>
           <p:nvPr/>
         </p:nvSpPr>
@@ -15767,7 +16038,7 @@
       </p:sp>
       <p:sp>
         <p:nvSpPr>
-          <p:cNvPr id="105" name="Google Shape;105;p20"/>
+          <p:cNvPr id="104" name="Google Shape;104;p20"/>
           <p:cNvSpPr/>
           <p:nvPr/>
         </p:nvSpPr>
@@ -15858,7 +16129,7 @@
       </p:sp>
       <p:sp>
         <p:nvSpPr>
-          <p:cNvPr id="106" name="Google Shape;106;p20"/>
+          <p:cNvPr id="105" name="Google Shape;105;p20"/>
           <p:cNvSpPr/>
           <p:nvPr/>
         </p:nvSpPr>
@@ -15905,7 +16176,7 @@
   <p:cSld>
     <p:spTree>
       <p:nvGrpSpPr>
-        <p:cNvPr id="110" name="Shape 110"/>
+        <p:cNvPr id="109" name="Shape 109"/>
         <p:cNvGrpSpPr/>
         <p:nvPr/>
       </p:nvGrpSpPr>
@@ -15919,7 +16190,7 @@
       </p:grpSpPr>
       <p:sp>
         <p:nvSpPr>
-          <p:cNvPr id="111" name="Google Shape;111;p21"/>
+          <p:cNvPr id="110" name="Google Shape;110;p21"/>
           <p:cNvSpPr/>
           <p:nvPr/>
         </p:nvSpPr>
@@ -15977,7 +16248,7 @@
       </p:sp>
       <p:sp>
         <p:nvSpPr>
-          <p:cNvPr id="112" name="Google Shape;112;p21"/>
+          <p:cNvPr id="111" name="Google Shape;111;p21"/>
           <p:cNvSpPr/>
           <p:nvPr/>
         </p:nvSpPr>
@@ -16375,7 +16646,7 @@
       </p:sp>
       <p:sp>
         <p:nvSpPr>
-          <p:cNvPr id="113" name="Google Shape;113;p21"/>
+          <p:cNvPr id="112" name="Google Shape;112;p21"/>
           <p:cNvSpPr/>
           <p:nvPr/>
         </p:nvSpPr>
@@ -16422,7 +16693,7 @@
   <p:cSld>
     <p:spTree>
       <p:nvGrpSpPr>
-        <p:cNvPr id="117" name="Shape 117"/>
+        <p:cNvPr id="116" name="Shape 116"/>
         <p:cNvGrpSpPr/>
         <p:nvPr/>
       </p:nvGrpSpPr>
@@ -16436,7 +16707,7 @@
       </p:grpSpPr>
       <p:sp>
         <p:nvSpPr>
-          <p:cNvPr id="118" name="Google Shape;118;p22"/>
+          <p:cNvPr id="117" name="Google Shape;117;p22"/>
           <p:cNvSpPr/>
           <p:nvPr/>
         </p:nvSpPr>
@@ -16494,7 +16765,7 @@
       </p:sp>
       <p:sp>
         <p:nvSpPr>
-          <p:cNvPr id="119" name="Google Shape;119;p22"/>
+          <p:cNvPr id="118" name="Google Shape;118;p22"/>
           <p:cNvSpPr/>
           <p:nvPr/>
         </p:nvSpPr>
@@ -16872,7 +17143,7 @@
       </p:sp>
       <p:sp>
         <p:nvSpPr>
-          <p:cNvPr id="120" name="Google Shape;120;p22"/>
+          <p:cNvPr id="119" name="Google Shape;119;p22"/>
           <p:cNvSpPr/>
           <p:nvPr/>
         </p:nvSpPr>

</xml_diff>